<commit_message>
Update ip setup in overview, and add demo3 snapshot
</commit_message>
<xml_diff>
--- a/doc/azocpupi_overview.pptx
+++ b/doc/azocpupi_overview.pptx
@@ -3807,19 +3807,17 @@
       </p:sp>
       <p:pic>
         <p:nvPicPr>
-          <p:cNvPr id="6" name="Content Placeholder 5">
+          <p:cNvPr id="10" name="Content Placeholder 4">
             <a:extLst>
               <a:ext uri="{FF2B5EF4-FFF2-40B4-BE49-F238E27FC236}">
-                <a16:creationId xmlns:a16="http://schemas.microsoft.com/office/drawing/2014/main" id="{356F09E5-D6B4-7A4F-A190-116F1B68C23F}"/>
+                <a16:creationId xmlns:a16="http://schemas.microsoft.com/office/drawing/2014/main" id="{EE562A7F-3209-7943-AF00-1FBC4A290738}"/>
               </a:ext>
             </a:extLst>
           </p:cNvPr>
           <p:cNvPicPr>
-            <a:picLocks noGrp="1" noChangeAspect="1"/>
+            <a:picLocks noChangeAspect="1"/>
           </p:cNvPicPr>
-          <p:nvPr>
-            <p:ph idx="1"/>
-          </p:nvPr>
+          <p:nvPr/>
         </p:nvPicPr>
         <p:blipFill>
           <a:blip r:embed="rId2"/>
@@ -3829,9 +3827,12 @@
         </p:blipFill>
         <p:spPr>
           <a:xfrm>
-            <a:off x="1270000" y="2318544"/>
-            <a:ext cx="9652000" cy="3365500"/>
+            <a:off x="1009650" y="2261394"/>
+            <a:ext cx="10172700" cy="3479800"/>
           </a:xfrm>
+          <a:prstGeom prst="rect">
+            <a:avLst/>
+          </a:prstGeom>
         </p:spPr>
       </p:pic>
     </p:spTree>

</xml_diff>